<commit_message>
Fixed results for walking
</commit_message>
<xml_diff>
--- a/report SVM handcrafted and PCA/AUTHENTICATION(all features).pptx
+++ b/report SVM handcrafted and PCA/AUTHENTICATION(all features).pptx
@@ -260,7 +260,7 @@
           <a:p>
             <a:fld id="{553A844F-FF5C-934C-B225-48B8FD889570}" type="datetimeFigureOut">
               <a:rPr lang="en-US" smtClean="0"/>
-              <a:t>10/17/2017</a:t>
+              <a:t>11/2/2017</a:t>
             </a:fld>
             <a:endParaRPr lang="en-US"/>
           </a:p>
@@ -430,7 +430,7 @@
           <a:p>
             <a:fld id="{553A844F-FF5C-934C-B225-48B8FD889570}" type="datetimeFigureOut">
               <a:rPr lang="en-US" smtClean="0"/>
-              <a:t>10/17/2017</a:t>
+              <a:t>11/2/2017</a:t>
             </a:fld>
             <a:endParaRPr lang="en-US"/>
           </a:p>
@@ -610,7 +610,7 @@
           <a:p>
             <a:fld id="{553A844F-FF5C-934C-B225-48B8FD889570}" type="datetimeFigureOut">
               <a:rPr lang="en-US" smtClean="0"/>
-              <a:t>10/17/2017</a:t>
+              <a:t>11/2/2017</a:t>
             </a:fld>
             <a:endParaRPr lang="en-US"/>
           </a:p>
@@ -780,7 +780,7 @@
           <a:p>
             <a:fld id="{553A844F-FF5C-934C-B225-48B8FD889570}" type="datetimeFigureOut">
               <a:rPr lang="en-US" smtClean="0"/>
-              <a:t>10/17/2017</a:t>
+              <a:t>11/2/2017</a:t>
             </a:fld>
             <a:endParaRPr lang="en-US"/>
           </a:p>
@@ -1026,7 +1026,7 @@
           <a:p>
             <a:fld id="{553A844F-FF5C-934C-B225-48B8FD889570}" type="datetimeFigureOut">
               <a:rPr lang="en-US" smtClean="0"/>
-              <a:t>10/17/2017</a:t>
+              <a:t>11/2/2017</a:t>
             </a:fld>
             <a:endParaRPr lang="en-US"/>
           </a:p>
@@ -1258,7 +1258,7 @@
           <a:p>
             <a:fld id="{553A844F-FF5C-934C-B225-48B8FD889570}" type="datetimeFigureOut">
               <a:rPr lang="en-US" smtClean="0"/>
-              <a:t>10/17/2017</a:t>
+              <a:t>11/2/2017</a:t>
             </a:fld>
             <a:endParaRPr lang="en-US"/>
           </a:p>
@@ -1625,7 +1625,7 @@
           <a:p>
             <a:fld id="{553A844F-FF5C-934C-B225-48B8FD889570}" type="datetimeFigureOut">
               <a:rPr lang="en-US" smtClean="0"/>
-              <a:t>10/17/2017</a:t>
+              <a:t>11/2/2017</a:t>
             </a:fld>
             <a:endParaRPr lang="en-US"/>
           </a:p>
@@ -1743,7 +1743,7 @@
           <a:p>
             <a:fld id="{553A844F-FF5C-934C-B225-48B8FD889570}" type="datetimeFigureOut">
               <a:rPr lang="en-US" smtClean="0"/>
-              <a:t>10/17/2017</a:t>
+              <a:t>11/2/2017</a:t>
             </a:fld>
             <a:endParaRPr lang="en-US"/>
           </a:p>
@@ -1838,7 +1838,7 @@
           <a:p>
             <a:fld id="{553A844F-FF5C-934C-B225-48B8FD889570}" type="datetimeFigureOut">
               <a:rPr lang="en-US" smtClean="0"/>
-              <a:t>10/17/2017</a:t>
+              <a:t>11/2/2017</a:t>
             </a:fld>
             <a:endParaRPr lang="en-US"/>
           </a:p>
@@ -2115,7 +2115,7 @@
           <a:p>
             <a:fld id="{553A844F-FF5C-934C-B225-48B8FD889570}" type="datetimeFigureOut">
               <a:rPr lang="en-US" smtClean="0"/>
-              <a:t>10/17/2017</a:t>
+              <a:t>11/2/2017</a:t>
             </a:fld>
             <a:endParaRPr lang="en-US"/>
           </a:p>
@@ -2368,7 +2368,7 @@
           <a:p>
             <a:fld id="{553A844F-FF5C-934C-B225-48B8FD889570}" type="datetimeFigureOut">
               <a:rPr lang="en-US" smtClean="0"/>
-              <a:t>10/17/2017</a:t>
+              <a:t>11/2/2017</a:t>
             </a:fld>
             <a:endParaRPr lang="en-US"/>
           </a:p>
@@ -2581,7 +2581,7 @@
           <a:p>
             <a:fld id="{553A844F-FF5C-934C-B225-48B8FD889570}" type="datetimeFigureOut">
               <a:rPr lang="en-US" smtClean="0"/>
-              <a:t>10/17/2017</a:t>
+              <a:t>11/2/2017</a:t>
             </a:fld>
             <a:endParaRPr lang="en-US"/>
           </a:p>
@@ -4394,11 +4394,7 @@
           <a:p>
             <a:r>
               <a:rPr lang="en-US" dirty="0" smtClean="0"/>
-              <a:t>Title: Average FAR and FRR for all Activities for all users using original features from filtered data with One-class </a:t>
-            </a:r>
-            <a:r>
-              <a:rPr lang="en-US" dirty="0" smtClean="0"/>
-              <a:t>SVMs</a:t>
+              <a:t>Title: Average FAR and FRR for all Activities for all users using original features from filtered data with One-class SVMs</a:t>
             </a:r>
           </a:p>
         </p:txBody>
@@ -4648,14 +4644,79 @@
                         <a:rPr lang="en-US" dirty="0" smtClean="0">
                           <a:latin typeface="+mn-lt"/>
                         </a:rPr>
+                        <a:t>FRR: 0.46351 FAR:</a:t>
+                      </a:r>
+                      <a:r>
+                        <a:rPr lang="en-US" baseline="0" dirty="0" smtClean="0">
+                          <a:latin typeface="+mn-lt"/>
+                        </a:rPr>
+                        <a:t> </a:t>
+                      </a:r>
+                      <a:r>
+                        <a:rPr lang="en-US" dirty="0" smtClean="0">
+                          <a:latin typeface="+mn-lt"/>
+                        </a:rPr>
+                        <a:t>0.49039</a:t>
+                      </a:r>
+                      <a:endParaRPr lang="en-US" dirty="0">
+                        <a:latin typeface="+mn-lt"/>
+                      </a:endParaRPr>
+                    </a:p>
+                  </a:txBody>
+                  <a:tcPr/>
+                </a:tc>
+                <a:tc>
+                  <a:txBody>
+                    <a:bodyPr/>
+                    <a:lstStyle/>
+                    <a:p>
+                      <a:r>
+                        <a:rPr lang="en-US" dirty="0" smtClean="0">
+                          <a:latin typeface="+mn-lt"/>
+                        </a:rPr>
+                        <a:t>FRR: 0.54320 FAR:</a:t>
+                      </a:r>
+                      <a:r>
+                        <a:rPr lang="en-US" baseline="0" dirty="0" smtClean="0">
+                          <a:latin typeface="+mn-lt"/>
+                        </a:rPr>
+                        <a:t> </a:t>
+                      </a:r>
+                      <a:r>
+                        <a:rPr lang="en-US" dirty="0" smtClean="0">
+                          <a:latin typeface="+mn-lt"/>
+                        </a:rPr>
+                        <a:t>0.52333</a:t>
+                      </a:r>
+                      <a:endParaRPr lang="en-US" dirty="0">
+                        <a:latin typeface="+mn-lt"/>
+                      </a:endParaRPr>
+                    </a:p>
+                  </a:txBody>
+                  <a:tcPr/>
+                </a:tc>
+                <a:tc>
+                  <a:txBody>
+                    <a:bodyPr/>
+                    <a:lstStyle/>
+                    <a:p>
+                      <a:r>
+                        <a:rPr lang="en-US" dirty="0" smtClean="0">
+                          <a:latin typeface="+mn-lt"/>
+                        </a:rPr>
                         <a:t>FRR: </a:t>
                       </a:r>
                       <a:r>
-                        <a:rPr lang="en-US" dirty="0" smtClean="0">
-                          <a:latin typeface="+mn-lt"/>
-                        </a:rPr>
-                        <a:t>0.46351 </a:t>
-                      </a:r>
+                        <a:rPr lang="mr-IN" dirty="0" smtClean="0">
+                          <a:latin typeface="+mn-lt"/>
+                        </a:rPr>
+                        <a:t>0.375 </a:t>
+                      </a:r>
+                      <a:endParaRPr lang="en-US" dirty="0" smtClean="0">
+                        <a:latin typeface="+mn-lt"/>
+                      </a:endParaRPr>
+                    </a:p>
+                    <a:p>
                       <a:r>
                         <a:rPr lang="en-US" dirty="0" smtClean="0">
                           <a:latin typeface="+mn-lt"/>
@@ -4669,13 +4730,13 @@
                         <a:t> </a:t>
                       </a:r>
                       <a:r>
-                        <a:rPr lang="en-US" dirty="0" smtClean="0">
-                          <a:latin typeface="+mn-lt"/>
-                        </a:rPr>
-                        <a:t>0.49039</a:t>
-                      </a:r>
-                      <a:endParaRPr lang="en-US" dirty="0">
-                        <a:latin typeface="+mn-lt"/>
+                        <a:rPr lang="mr-IN" dirty="0" smtClean="0">
+                          <a:latin typeface="+mn-lt"/>
+                        </a:rPr>
+                        <a:t>0.57351</a:t>
+                      </a:r>
+                      <a:endParaRPr lang="en-US" dirty="0">
+                        <a:latin typeface="Mangal (Основной текст)"/>
                       </a:endParaRPr>
                     </a:p>
                   </a:txBody>
@@ -4693,16 +4754,21 @@
                         <a:t>FRR: </a:t>
                       </a:r>
                       <a:r>
-                        <a:rPr lang="en-US" dirty="0" smtClean="0">
-                          <a:latin typeface="+mn-lt"/>
-                        </a:rPr>
-                        <a:t>0.54320 FAR</a:t>
-                      </a:r>
-                      <a:r>
-                        <a:rPr lang="en-US" dirty="0" smtClean="0">
-                          <a:latin typeface="+mn-lt"/>
-                        </a:rPr>
-                        <a:t>:</a:t>
+                        <a:rPr lang="mr-IN" dirty="0" smtClean="0">
+                          <a:latin typeface="+mn-lt"/>
+                        </a:rPr>
+                        <a:t>0.49425 </a:t>
+                      </a:r>
+                      <a:endParaRPr lang="en-US" dirty="0" smtClean="0">
+                        <a:latin typeface="+mn-lt"/>
+                      </a:endParaRPr>
+                    </a:p>
+                    <a:p>
+                      <a:r>
+                        <a:rPr lang="en-US" dirty="0" smtClean="0">
+                          <a:latin typeface="+mn-lt"/>
+                        </a:rPr>
+                        <a:t>FAR:</a:t>
                       </a:r>
                       <a:r>
                         <a:rPr lang="en-US" baseline="0" dirty="0" smtClean="0">
@@ -4711,63 +4777,10 @@
                         <a:t> </a:t>
                       </a:r>
                       <a:r>
-                        <a:rPr lang="en-US" dirty="0" smtClean="0">
-                          <a:latin typeface="+mn-lt"/>
-                        </a:rPr>
-                        <a:t>0.52333</a:t>
-                      </a:r>
-                      <a:endParaRPr lang="en-US" dirty="0">
-                        <a:latin typeface="+mn-lt"/>
-                      </a:endParaRPr>
-                    </a:p>
-                  </a:txBody>
-                  <a:tcPr/>
-                </a:tc>
-                <a:tc>
-                  <a:txBody>
-                    <a:bodyPr/>
-                    <a:lstStyle/>
-                    <a:p>
-                      <a:r>
-                        <a:rPr lang="en-US" dirty="0" smtClean="0">
-                          <a:latin typeface="+mn-lt"/>
-                        </a:rPr>
-                        <a:t>FRR: </a:t>
-                      </a:r>
-                      <a:r>
                         <a:rPr lang="mr-IN" dirty="0" smtClean="0">
                           <a:latin typeface="+mn-lt"/>
                         </a:rPr>
-                        <a:t>0.375 </a:t>
-                      </a:r>
-                      <a:endParaRPr lang="en-US" dirty="0" smtClean="0">
-                        <a:latin typeface="+mn-lt"/>
-                      </a:endParaRPr>
-                    </a:p>
-                    <a:p>
-                      <a:r>
-                        <a:rPr lang="en-US" dirty="0" smtClean="0">
-                          <a:latin typeface="+mn-lt"/>
-                        </a:rPr>
-                        <a:t>FAR</a:t>
-                      </a:r>
-                      <a:r>
-                        <a:rPr lang="en-US" dirty="0" smtClean="0">
-                          <a:latin typeface="+mn-lt"/>
-                        </a:rPr>
-                        <a:t>:</a:t>
-                      </a:r>
-                      <a:r>
-                        <a:rPr lang="en-US" baseline="0" dirty="0" smtClean="0">
-                          <a:latin typeface="+mn-lt"/>
-                        </a:rPr>
-                        <a:t> </a:t>
-                      </a:r>
-                      <a:r>
-                        <a:rPr lang="mr-IN" dirty="0" smtClean="0">
-                          <a:latin typeface="+mn-lt"/>
-                        </a:rPr>
-                        <a:t>0.57351</a:t>
+                        <a:t>0.43080</a:t>
                       </a:r>
                       <a:endParaRPr lang="en-US" dirty="0">
                         <a:latin typeface="Mangal (Основной текст)"/>
@@ -4785,72 +4798,7 @@
                         <a:rPr lang="en-US" dirty="0" smtClean="0">
                           <a:latin typeface="+mn-lt"/>
                         </a:rPr>
-                        <a:t>FRR: </a:t>
-                      </a:r>
-                      <a:r>
-                        <a:rPr lang="mr-IN" dirty="0" smtClean="0">
-                          <a:latin typeface="+mn-lt"/>
-                        </a:rPr>
-                        <a:t>0.49425 </a:t>
-                      </a:r>
-                      <a:endParaRPr lang="en-US" dirty="0" smtClean="0">
-                        <a:latin typeface="+mn-lt"/>
-                      </a:endParaRPr>
-                    </a:p>
-                    <a:p>
-                      <a:r>
-                        <a:rPr lang="en-US" dirty="0" smtClean="0">
-                          <a:latin typeface="+mn-lt"/>
-                        </a:rPr>
-                        <a:t>FAR:</a:t>
-                      </a:r>
-                      <a:r>
-                        <a:rPr lang="en-US" baseline="0" dirty="0" smtClean="0">
-                          <a:latin typeface="+mn-lt"/>
-                        </a:rPr>
-                        <a:t> </a:t>
-                      </a:r>
-                      <a:r>
-                        <a:rPr lang="mr-IN" dirty="0" smtClean="0">
-                          <a:latin typeface="+mn-lt"/>
-                        </a:rPr>
-                        <a:t>0.43080</a:t>
-                      </a:r>
-                      <a:endParaRPr lang="en-US" dirty="0">
-                        <a:latin typeface="Mangal (Основной текст)"/>
-                      </a:endParaRPr>
-                    </a:p>
-                  </a:txBody>
-                  <a:tcPr/>
-                </a:tc>
-                <a:tc>
-                  <a:txBody>
-                    <a:bodyPr/>
-                    <a:lstStyle/>
-                    <a:p>
-                      <a:r>
-                        <a:rPr lang="en-US" dirty="0" smtClean="0">
-                          <a:latin typeface="+mn-lt"/>
-                        </a:rPr>
-                        <a:t>FRR: </a:t>
-                      </a:r>
-                      <a:r>
-                        <a:rPr lang="en-US" dirty="0" smtClean="0">
-                          <a:latin typeface="+mn-lt"/>
-                        </a:rPr>
-                        <a:t>0.52230 </a:t>
-                      </a:r>
-                      <a:r>
-                        <a:rPr lang="en-US" dirty="0" smtClean="0">
-                          <a:latin typeface="+mn-lt"/>
-                        </a:rPr>
-                        <a:t>FAR: </a:t>
-                      </a:r>
-                      <a:r>
-                        <a:rPr lang="en-US" dirty="0" smtClean="0">
-                          <a:latin typeface="+mn-lt"/>
-                        </a:rPr>
-                        <a:t>0.50966</a:t>
+                        <a:t>FRR: 0.52230 FAR: 0.50966</a:t>
                       </a:r>
                       <a:endParaRPr lang="en-US" dirty="0">
                         <a:latin typeface="+mn-lt"/>
@@ -4888,33 +4836,50 @@
                         <a:rPr lang="en-US" dirty="0" smtClean="0">
                           <a:latin typeface="+mn-lt"/>
                         </a:rPr>
-                        <a:t>FRR: </a:t>
-                      </a:r>
-                      <a:r>
-                        <a:rPr lang="en-US" dirty="0" smtClean="0">
-                          <a:latin typeface="+mn-lt"/>
-                        </a:rPr>
-                        <a:t>0.44871</a:t>
-                      </a:r>
-                    </a:p>
-                    <a:p>
-                      <a:r>
-                        <a:rPr lang="en-US" dirty="0" smtClean="0">
-                          <a:latin typeface="+mn-lt"/>
-                        </a:rPr>
-                        <a:t>FAR</a:t>
-                      </a:r>
-                      <a:r>
-                        <a:rPr lang="en-US" dirty="0" smtClean="0">
-                          <a:latin typeface="+mn-lt"/>
-                        </a:rPr>
-                        <a:t>: </a:t>
-                      </a:r>
-                      <a:r>
-                        <a:rPr lang="en-US" dirty="0" smtClean="0">
-                          <a:latin typeface="+mn-lt"/>
-                        </a:rPr>
-                        <a:t>0.54381</a:t>
+                        <a:t>FRR: 0.44871</a:t>
+                      </a:r>
+                    </a:p>
+                    <a:p>
+                      <a:r>
+                        <a:rPr lang="en-US" dirty="0" smtClean="0">
+                          <a:latin typeface="+mn-lt"/>
+                        </a:rPr>
+                        <a:t>FAR: 0.54381</a:t>
+                      </a:r>
+                    </a:p>
+                  </a:txBody>
+                  <a:tcPr/>
+                </a:tc>
+                <a:tc>
+                  <a:txBody>
+                    <a:bodyPr/>
+                    <a:lstStyle/>
+                    <a:p>
+                      <a:r>
+                        <a:rPr lang="en-US" dirty="0" smtClean="0">
+                          <a:latin typeface="+mn-lt"/>
+                        </a:rPr>
+                        <a:t>FRR:</a:t>
+                      </a:r>
+                      <a:r>
+                        <a:rPr lang="en-US" baseline="0" dirty="0">
+                          <a:latin typeface="+mn-lt"/>
+                        </a:rPr>
+                        <a:t> </a:t>
+                      </a:r>
+                      <a:r>
+                        <a:rPr lang="en-US" baseline="0" dirty="0" smtClean="0">
+                          <a:latin typeface="+mn-lt"/>
+                        </a:rPr>
+                        <a:t>0.45070</a:t>
+                      </a:r>
+                    </a:p>
+                    <a:p>
+                      <a:r>
+                        <a:rPr lang="en-US" baseline="0" dirty="0" smtClean="0">
+                          <a:latin typeface="+mn-lt"/>
+                        </a:rPr>
+                        <a:t>FAR: 0.55885</a:t>
                       </a:r>
                       <a:endParaRPr lang="en-US" dirty="0" smtClean="0">
                         <a:latin typeface="+mn-lt"/>
@@ -4932,7 +4897,15 @@
                         <a:rPr lang="en-US" dirty="0" smtClean="0">
                           <a:latin typeface="+mn-lt"/>
                         </a:rPr>
-                        <a:t>FRR:</a:t>
+                        <a:t>FRR: 0.39795</a:t>
+                      </a:r>
+                    </a:p>
+                    <a:p>
+                      <a:r>
+                        <a:rPr lang="en-US" dirty="0" smtClean="0">
+                          <a:latin typeface="+mn-lt"/>
+                        </a:rPr>
+                        <a:t>FAR:</a:t>
                       </a:r>
                       <a:r>
                         <a:rPr lang="en-US" baseline="0" dirty="0">
@@ -4944,27 +4917,7 @@
                         <a:rPr lang="en-US" baseline="0" dirty="0" smtClean="0">
                           <a:latin typeface="+mn-lt"/>
                         </a:rPr>
-                        <a:t>0.45070</a:t>
-                      </a:r>
-                    </a:p>
-                    <a:p>
-                      <a:r>
-                        <a:rPr lang="en-US" baseline="0" dirty="0" smtClean="0">
-                          <a:latin typeface="+mn-lt"/>
-                        </a:rPr>
-                        <a:t>FAR</a:t>
-                      </a:r>
-                      <a:r>
-                        <a:rPr lang="en-US" baseline="0" dirty="0" smtClean="0">
-                          <a:latin typeface="+mn-lt"/>
-                        </a:rPr>
-                        <a:t>: </a:t>
-                      </a:r>
-                      <a:r>
-                        <a:rPr lang="en-US" baseline="0" dirty="0" smtClean="0">
-                          <a:latin typeface="+mn-lt"/>
-                        </a:rPr>
-                        <a:t>0.55885</a:t>
+                        <a:t>0.47158</a:t>
                       </a:r>
                       <a:endParaRPr lang="en-US" dirty="0" smtClean="0">
                         <a:latin typeface="+mn-lt"/>
@@ -4982,127 +4935,41 @@
                         <a:rPr lang="en-US" dirty="0" smtClean="0">
                           <a:latin typeface="+mn-lt"/>
                         </a:rPr>
-                        <a:t>FRR: </a:t>
-                      </a:r>
-                      <a:r>
-                        <a:rPr lang="en-US" dirty="0" smtClean="0">
-                          <a:latin typeface="+mn-lt"/>
-                        </a:rPr>
-                        <a:t>0.39795</a:t>
-                      </a:r>
-                    </a:p>
-                    <a:p>
-                      <a:r>
-                        <a:rPr lang="en-US" dirty="0" smtClean="0">
-                          <a:latin typeface="+mn-lt"/>
-                        </a:rPr>
-                        <a:t>FAR</a:t>
-                      </a:r>
-                      <a:r>
-                        <a:rPr lang="en-US" dirty="0" smtClean="0">
-                          <a:latin typeface="+mn-lt"/>
-                        </a:rPr>
-                        <a:t>:</a:t>
-                      </a:r>
-                      <a:r>
-                        <a:rPr lang="en-US" baseline="0" dirty="0">
-                          <a:latin typeface="+mn-lt"/>
-                        </a:rPr>
-                        <a:t> </a:t>
-                      </a:r>
-                      <a:r>
-                        <a:rPr lang="en-US" baseline="0" dirty="0" smtClean="0">
-                          <a:latin typeface="+mn-lt"/>
-                        </a:rPr>
-                        <a:t>0.47158</a:t>
-                      </a:r>
-                      <a:endParaRPr lang="en-US" dirty="0" smtClean="0">
-                        <a:latin typeface="+mn-lt"/>
-                      </a:endParaRPr>
-                    </a:p>
-                  </a:txBody>
-                  <a:tcPr/>
-                </a:tc>
-                <a:tc>
-                  <a:txBody>
-                    <a:bodyPr/>
-                    <a:lstStyle/>
-                    <a:p>
-                      <a:r>
-                        <a:rPr lang="en-US" dirty="0" smtClean="0">
-                          <a:latin typeface="+mn-lt"/>
-                        </a:rPr>
-                        <a:t>FRR: </a:t>
-                      </a:r>
-                      <a:r>
-                        <a:rPr lang="en-US" dirty="0" smtClean="0">
-                          <a:latin typeface="+mn-lt"/>
-                        </a:rPr>
-                        <a:t>0.38775</a:t>
-                      </a:r>
-                    </a:p>
-                    <a:p>
-                      <a:r>
-                        <a:rPr lang="en-US" dirty="0" smtClean="0">
-                          <a:latin typeface="+mn-lt"/>
-                        </a:rPr>
-                        <a:t>FAR</a:t>
-                      </a:r>
-                      <a:r>
-                        <a:rPr lang="en-US" dirty="0" smtClean="0">
-                          <a:latin typeface="+mn-lt"/>
-                        </a:rPr>
-                        <a:t>: </a:t>
-                      </a:r>
-                      <a:r>
-                        <a:rPr lang="en-US" dirty="0" smtClean="0">
-                          <a:latin typeface="+mn-lt"/>
-                        </a:rPr>
-                        <a:t>0.51441 </a:t>
-                      </a:r>
-                      <a:endParaRPr lang="en-US" dirty="0">
-                        <a:latin typeface="+mn-lt"/>
-                      </a:endParaRPr>
-                    </a:p>
-                  </a:txBody>
-                  <a:tcPr/>
-                </a:tc>
-                <a:tc>
-                  <a:txBody>
-                    <a:bodyPr/>
-                    <a:lstStyle/>
-                    <a:p>
-                      <a:r>
-                        <a:rPr lang="en-US" dirty="0" smtClean="0">
-                          <a:latin typeface="+mn-lt"/>
-                        </a:rPr>
-                        <a:t>FRR: </a:t>
-                      </a:r>
-                      <a:r>
-                        <a:rPr lang="en-US" dirty="0" smtClean="0">
-                          <a:latin typeface="+mn-lt"/>
-                        </a:rPr>
-                        <a:t>0.47235</a:t>
-                      </a:r>
-                    </a:p>
-                    <a:p>
-                      <a:r>
-                        <a:rPr lang="en-US" dirty="0" smtClean="0">
-                          <a:latin typeface="+mn-lt"/>
-                        </a:rPr>
-                        <a:t>FAR</a:t>
-                      </a:r>
-                      <a:r>
-                        <a:rPr lang="en-US" dirty="0" smtClean="0">
-                          <a:latin typeface="+mn-lt"/>
-                        </a:rPr>
-                        <a:t>: </a:t>
-                      </a:r>
-                      <a:r>
-                        <a:rPr lang="en-US" dirty="0" smtClean="0">
-                          <a:latin typeface="+mn-lt"/>
-                        </a:rPr>
-                        <a:t>0.50194</a:t>
+                        <a:t>FRR: 0.38775</a:t>
+                      </a:r>
+                    </a:p>
+                    <a:p>
+                      <a:r>
+                        <a:rPr lang="en-US" dirty="0" smtClean="0">
+                          <a:latin typeface="+mn-lt"/>
+                        </a:rPr>
+                        <a:t>FAR: 0.51441 </a:t>
+                      </a:r>
+                      <a:endParaRPr lang="en-US" dirty="0">
+                        <a:latin typeface="+mn-lt"/>
+                      </a:endParaRPr>
+                    </a:p>
+                  </a:txBody>
+                  <a:tcPr/>
+                </a:tc>
+                <a:tc>
+                  <a:txBody>
+                    <a:bodyPr/>
+                    <a:lstStyle/>
+                    <a:p>
+                      <a:r>
+                        <a:rPr lang="en-US" dirty="0" smtClean="0">
+                          <a:latin typeface="+mn-lt"/>
+                        </a:rPr>
+                        <a:t>FRR: 0.47235</a:t>
+                      </a:r>
+                    </a:p>
+                    <a:p>
+                      <a:r>
+                        <a:rPr lang="en-US" dirty="0" smtClean="0">
+                          <a:latin typeface="+mn-lt"/>
+                        </a:rPr>
+                        <a:t>FAR: 0.50194</a:t>
                       </a:r>
                       <a:endParaRPr lang="en-US" dirty="0">
                         <a:latin typeface="+mn-lt"/>
@@ -5140,210 +5007,120 @@
                         <a:rPr lang="en-US" dirty="0" smtClean="0">
                           <a:latin typeface="+mn-lt"/>
                         </a:rPr>
-                        <a:t>FRR: </a:t>
-                      </a:r>
-                      <a:r>
-                        <a:rPr lang="en-US" dirty="0" smtClean="0">
-                          <a:latin typeface="+mn-lt"/>
-                        </a:rPr>
-                        <a:t>0.50617</a:t>
-                      </a:r>
-                    </a:p>
-                    <a:p>
-                      <a:r>
-                        <a:rPr lang="en-US" dirty="0" smtClean="0">
-                          <a:latin typeface="+mn-lt"/>
-                        </a:rPr>
-                        <a:t>FAR</a:t>
-                      </a:r>
-                      <a:r>
-                        <a:rPr lang="en-US" dirty="0" smtClean="0">
-                          <a:latin typeface="+mn-lt"/>
-                        </a:rPr>
-                        <a:t>: </a:t>
-                      </a:r>
-                      <a:r>
-                        <a:rPr lang="en-US" dirty="0" smtClean="0">
-                          <a:latin typeface="+mn-lt"/>
-                        </a:rPr>
-                        <a:t>0.52984</a:t>
-                      </a:r>
-                      <a:endParaRPr lang="en-US" dirty="0">
-                        <a:latin typeface="+mn-lt"/>
-                      </a:endParaRPr>
-                    </a:p>
-                  </a:txBody>
-                  <a:tcPr/>
-                </a:tc>
-                <a:tc>
-                  <a:txBody>
-                    <a:bodyPr/>
-                    <a:lstStyle/>
-                    <a:p>
-                      <a:r>
-                        <a:rPr lang="en-US" dirty="0" smtClean="0">
-                          <a:latin typeface="+mn-lt"/>
-                        </a:rPr>
-                        <a:t>FRR: </a:t>
-                      </a:r>
-                      <a:r>
-                        <a:rPr lang="en-US" dirty="0" smtClean="0">
-                          <a:latin typeface="+mn-lt"/>
-                        </a:rPr>
-                        <a:t>0.48192</a:t>
-                      </a:r>
-                      <a:endParaRPr lang="en-US" dirty="0" smtClean="0">
-                        <a:latin typeface="+mn-lt"/>
-                      </a:endParaRPr>
-                    </a:p>
-                    <a:p>
-                      <a:r>
-                        <a:rPr lang="en-US" dirty="0" smtClean="0">
-                          <a:latin typeface="+mn-lt"/>
-                        </a:rPr>
-                        <a:t>FAR: </a:t>
-                      </a:r>
-                      <a:r>
-                        <a:rPr lang="en-US" dirty="0" smtClean="0">
-                          <a:latin typeface="+mn-lt"/>
-                        </a:rPr>
-                        <a:t>0.46940</a:t>
-                      </a:r>
-                      <a:endParaRPr lang="en-US" dirty="0">
-                        <a:latin typeface="+mn-lt"/>
-                      </a:endParaRPr>
-                    </a:p>
-                  </a:txBody>
-                  <a:tcPr/>
-                </a:tc>
-                <a:tc>
-                  <a:txBody>
-                    <a:bodyPr/>
-                    <a:lstStyle/>
-                    <a:p>
-                      <a:r>
-                        <a:rPr lang="en-US" dirty="0" smtClean="0">
-                          <a:latin typeface="+mn-lt"/>
-                        </a:rPr>
-                        <a:t>FRR: </a:t>
-                      </a:r>
-                      <a:r>
-                        <a:rPr lang="en-US" dirty="0" smtClean="0">
-                          <a:latin typeface="+mn-lt"/>
-                        </a:rPr>
-                        <a:t>0.50649</a:t>
-                      </a:r>
-                    </a:p>
-                    <a:p>
-                      <a:r>
-                        <a:rPr lang="en-US" dirty="0" smtClean="0">
-                          <a:latin typeface="+mn-lt"/>
-                        </a:rPr>
-                        <a:t>FAR</a:t>
-                      </a:r>
-                      <a:r>
-                        <a:rPr lang="en-US" dirty="0" smtClean="0">
-                          <a:latin typeface="+mn-lt"/>
-                        </a:rPr>
-                        <a:t>: </a:t>
-                      </a:r>
-                      <a:r>
-                        <a:rPr lang="en-US" dirty="0" smtClean="0">
-                          <a:latin typeface="+mn-lt"/>
-                        </a:rPr>
-                        <a:t>0.46770</a:t>
-                      </a:r>
-                      <a:endParaRPr lang="en-US" dirty="0">
-                        <a:latin typeface="+mn-lt"/>
-                      </a:endParaRPr>
-                    </a:p>
-                  </a:txBody>
-                  <a:tcPr/>
-                </a:tc>
-                <a:tc>
-                  <a:txBody>
-                    <a:bodyPr/>
-                    <a:lstStyle/>
-                    <a:p>
-                      <a:r>
-                        <a:rPr lang="en-US" dirty="0" smtClean="0">
-                          <a:latin typeface="+mn-lt"/>
-                        </a:rPr>
-                        <a:t>FRR: </a:t>
-                      </a:r>
-                      <a:r>
-                        <a:rPr lang="en-US" dirty="0" smtClean="0">
-                          <a:latin typeface="+mn-lt"/>
-                        </a:rPr>
-                        <a:t>0.45348</a:t>
-                      </a:r>
-                    </a:p>
-                    <a:p>
-                      <a:r>
-                        <a:rPr lang="en-US" dirty="0" smtClean="0">
-                          <a:latin typeface="+mn-lt"/>
-                        </a:rPr>
-                        <a:t>FAR</a:t>
-                      </a:r>
-                      <a:r>
-                        <a:rPr lang="en-US" dirty="0" smtClean="0">
-                          <a:latin typeface="+mn-lt"/>
-                        </a:rPr>
-                        <a:t>: </a:t>
-                      </a:r>
-                      <a:r>
-                        <a:rPr lang="en-US" dirty="0" smtClean="0">
-                          <a:latin typeface="+mn-lt"/>
-                        </a:rPr>
-                        <a:t>0.48753</a:t>
-                      </a:r>
-                      <a:endParaRPr lang="en-US" dirty="0">
-                        <a:latin typeface="+mn-lt"/>
-                      </a:endParaRPr>
-                    </a:p>
-                  </a:txBody>
-                  <a:tcPr/>
-                </a:tc>
-                <a:tc>
-                  <a:txBody>
-                    <a:bodyPr/>
-                    <a:lstStyle/>
-                    <a:p>
-                      <a:r>
-                        <a:rPr lang="en-US" dirty="0" smtClean="0">
-                          <a:latin typeface="+mn-lt"/>
-                        </a:rPr>
-                        <a:t>FRR: </a:t>
-                      </a:r>
-                      <a:r>
-                        <a:rPr lang="en-US" dirty="0" smtClean="0">
-                          <a:latin typeface="+mn-lt"/>
-                        </a:rPr>
-                        <a:t>0.43142</a:t>
-                      </a:r>
-                    </a:p>
-                    <a:p>
-                      <a:r>
-                        <a:rPr lang="en-US" dirty="0" smtClean="0">
-                          <a:latin typeface="+mn-lt"/>
-                        </a:rPr>
-                        <a:t>FAR</a:t>
-                      </a:r>
-                      <a:r>
-                        <a:rPr lang="en-US" dirty="0" smtClean="0">
-                          <a:latin typeface="+mn-lt"/>
-                        </a:rPr>
-                        <a:t>: </a:t>
-                      </a:r>
-                      <a:r>
-                        <a:rPr lang="en-US" dirty="0" smtClean="0">
-                          <a:latin typeface="+mn-lt"/>
-                        </a:rPr>
-                        <a:t>0.46127</a:t>
-                      </a:r>
-                      <a:endParaRPr lang="en-US" dirty="0" smtClean="0">
-                        <a:latin typeface="+mn-lt"/>
-                      </a:endParaRPr>
+                        <a:t>FRR: 0.50617</a:t>
+                      </a:r>
+                    </a:p>
+                    <a:p>
+                      <a:r>
+                        <a:rPr lang="en-US" dirty="0" smtClean="0">
+                          <a:latin typeface="+mn-lt"/>
+                        </a:rPr>
+                        <a:t>FAR: 0.52984</a:t>
+                      </a:r>
+                      <a:endParaRPr lang="en-US" dirty="0">
+                        <a:latin typeface="+mn-lt"/>
+                      </a:endParaRPr>
+                    </a:p>
+                  </a:txBody>
+                  <a:tcPr/>
+                </a:tc>
+                <a:tc>
+                  <a:txBody>
+                    <a:bodyPr/>
+                    <a:lstStyle/>
+                    <a:p>
+                      <a:r>
+                        <a:rPr lang="en-US" dirty="0" smtClean="0">
+                          <a:latin typeface="+mn-lt"/>
+                        </a:rPr>
+                        <a:t>FRR: 0.48192</a:t>
+                      </a:r>
+                    </a:p>
+                    <a:p>
+                      <a:r>
+                        <a:rPr lang="en-US" dirty="0" smtClean="0">
+                          <a:latin typeface="+mn-lt"/>
+                        </a:rPr>
+                        <a:t>FAR: 0.46940</a:t>
+                      </a:r>
+                      <a:endParaRPr lang="en-US" dirty="0">
+                        <a:latin typeface="+mn-lt"/>
+                      </a:endParaRPr>
+                    </a:p>
+                  </a:txBody>
+                  <a:tcPr/>
+                </a:tc>
+                <a:tc>
+                  <a:txBody>
+                    <a:bodyPr/>
+                    <a:lstStyle/>
+                    <a:p>
+                      <a:r>
+                        <a:rPr lang="en-US" dirty="0" smtClean="0">
+                          <a:latin typeface="+mn-lt"/>
+                        </a:rPr>
+                        <a:t>FRR: 0.50649</a:t>
+                      </a:r>
+                    </a:p>
+                    <a:p>
+                      <a:r>
+                        <a:rPr lang="en-US" dirty="0" smtClean="0">
+                          <a:latin typeface="+mn-lt"/>
+                        </a:rPr>
+                        <a:t>FAR: 0.46770</a:t>
+                      </a:r>
+                      <a:endParaRPr lang="en-US" dirty="0">
+                        <a:latin typeface="+mn-lt"/>
+                      </a:endParaRPr>
+                    </a:p>
+                  </a:txBody>
+                  <a:tcPr/>
+                </a:tc>
+                <a:tc>
+                  <a:txBody>
+                    <a:bodyPr/>
+                    <a:lstStyle/>
+                    <a:p>
+                      <a:r>
+                        <a:rPr lang="en-US" dirty="0" smtClean="0">
+                          <a:latin typeface="+mn-lt"/>
+                        </a:rPr>
+                        <a:t>FRR: 0.45348</a:t>
+                      </a:r>
+                    </a:p>
+                    <a:p>
+                      <a:r>
+                        <a:rPr lang="en-US" dirty="0" smtClean="0">
+                          <a:latin typeface="+mn-lt"/>
+                        </a:rPr>
+                        <a:t>FAR: 0.48753</a:t>
+                      </a:r>
+                      <a:endParaRPr lang="en-US" dirty="0">
+                        <a:latin typeface="+mn-lt"/>
+                      </a:endParaRPr>
+                    </a:p>
+                  </a:txBody>
+                  <a:tcPr/>
+                </a:tc>
+                <a:tc>
+                  <a:txBody>
+                    <a:bodyPr/>
+                    <a:lstStyle/>
+                    <a:p>
+                      <a:r>
+                        <a:rPr lang="en-US" dirty="0" smtClean="0">
+                          <a:latin typeface="+mn-lt"/>
+                        </a:rPr>
+                        <a:t>FRR: 0.43142</a:t>
+                      </a:r>
+                    </a:p>
+                    <a:p>
+                      <a:r>
+                        <a:rPr lang="en-US" dirty="0" smtClean="0">
+                          <a:latin typeface="+mn-lt"/>
+                        </a:rPr>
+                        <a:t>FAR: 0.46127</a:t>
+                      </a:r>
                     </a:p>
                   </a:txBody>
                   <a:tcPr/>
@@ -5377,209 +5154,116 @@
                         <a:rPr lang="en-US" dirty="0" smtClean="0">
                           <a:latin typeface="+mn-lt"/>
                         </a:rPr>
-                        <a:t>FRR: </a:t>
-                      </a:r>
-                      <a:r>
-                        <a:rPr lang="en-US" dirty="0" smtClean="0">
-                          <a:latin typeface="+mn-lt"/>
-                        </a:rPr>
-                        <a:t>0.45454</a:t>
-                      </a:r>
-                    </a:p>
-                    <a:p>
-                      <a:r>
-                        <a:rPr lang="en-US" dirty="0" smtClean="0">
-                          <a:latin typeface="+mn-lt"/>
-                        </a:rPr>
-                        <a:t>FAR</a:t>
-                      </a:r>
-                      <a:r>
-                        <a:rPr lang="en-US" dirty="0" smtClean="0">
-                          <a:latin typeface="+mn-lt"/>
-                        </a:rPr>
-                        <a:t>: </a:t>
-                      </a:r>
-                      <a:r>
-                        <a:rPr lang="en-US" dirty="0" smtClean="0">
-                          <a:latin typeface="+mn-lt"/>
-                        </a:rPr>
-                        <a:t>0.46605 </a:t>
-                      </a:r>
-                      <a:endParaRPr lang="en-US" dirty="0" smtClean="0">
-                        <a:latin typeface="+mn-lt"/>
-                      </a:endParaRPr>
-                    </a:p>
-                  </a:txBody>
-                  <a:tcPr/>
-                </a:tc>
-                <a:tc>
-                  <a:txBody>
-                    <a:bodyPr/>
-                    <a:lstStyle/>
-                    <a:p>
-                      <a:r>
-                        <a:rPr lang="en-US" dirty="0" smtClean="0">
-                          <a:latin typeface="+mn-lt"/>
-                        </a:rPr>
-                        <a:t>FRR: </a:t>
-                      </a:r>
-                      <a:r>
-                        <a:rPr lang="en-US" dirty="0" smtClean="0">
-                          <a:latin typeface="+mn-lt"/>
-                        </a:rPr>
-                        <a:t>0.49275</a:t>
-                      </a:r>
-                    </a:p>
-                    <a:p>
-                      <a:r>
-                        <a:rPr lang="en-US" dirty="0" smtClean="0">
-                          <a:latin typeface="+mn-lt"/>
-                        </a:rPr>
-                        <a:t>FAR</a:t>
-                      </a:r>
-                      <a:r>
-                        <a:rPr lang="en-US" dirty="0" smtClean="0">
-                          <a:latin typeface="+mn-lt"/>
-                        </a:rPr>
-                        <a:t>: </a:t>
-                      </a:r>
-                      <a:r>
-                        <a:rPr lang="en-US" dirty="0" smtClean="0">
-                          <a:latin typeface="+mn-lt"/>
-                        </a:rPr>
-                        <a:t>0.41251</a:t>
-                      </a:r>
-                      <a:endParaRPr lang="en-US" dirty="0">
-                        <a:latin typeface="+mn-lt"/>
-                      </a:endParaRPr>
-                    </a:p>
-                  </a:txBody>
-                  <a:tcPr/>
-                </a:tc>
-                <a:tc>
-                  <a:txBody>
-                    <a:bodyPr/>
-                    <a:lstStyle/>
-                    <a:p>
-                      <a:r>
-                        <a:rPr lang="en-US" dirty="0" smtClean="0">
-                          <a:latin typeface="+mn-lt"/>
-                        </a:rPr>
-                        <a:t>FRR: </a:t>
-                      </a:r>
-                      <a:r>
-                        <a:rPr lang="en-US" dirty="0" smtClean="0">
-                          <a:latin typeface="+mn-lt"/>
-                        </a:rPr>
-                        <a:t>0.42352</a:t>
-                      </a:r>
-                    </a:p>
-                    <a:p>
-                      <a:r>
-                        <a:rPr lang="en-US" dirty="0" smtClean="0">
-                          <a:latin typeface="+mn-lt"/>
-                        </a:rPr>
-                        <a:t>FAR</a:t>
-                      </a:r>
-                      <a:r>
-                        <a:rPr lang="en-US" dirty="0" smtClean="0">
-                          <a:latin typeface="+mn-lt"/>
-                        </a:rPr>
-                        <a:t>: </a:t>
-                      </a:r>
-                      <a:r>
-                        <a:rPr lang="en-US" dirty="0" smtClean="0">
-                          <a:latin typeface="+mn-lt"/>
-                        </a:rPr>
-                        <a:t>0.40416</a:t>
-                      </a:r>
-                      <a:endParaRPr lang="en-US" dirty="0">
-                        <a:latin typeface="+mn-lt"/>
-                      </a:endParaRPr>
-                    </a:p>
-                  </a:txBody>
-                  <a:tcPr/>
-                </a:tc>
-                <a:tc>
-                  <a:txBody>
-                    <a:bodyPr/>
-                    <a:lstStyle/>
-                    <a:p>
-                      <a:r>
-                        <a:rPr lang="en-US" dirty="0" smtClean="0">
-                          <a:latin typeface="+mn-lt"/>
-                        </a:rPr>
-                        <a:t>FRR: </a:t>
-                      </a:r>
-                      <a:r>
-                        <a:rPr lang="en-US" dirty="0" smtClean="0">
-                          <a:latin typeface="+mn-lt"/>
-                        </a:rPr>
-                        <a:t>0.43820</a:t>
-                      </a:r>
-                    </a:p>
-                    <a:p>
-                      <a:r>
-                        <a:rPr lang="en-US" dirty="0" smtClean="0">
-                          <a:latin typeface="+mn-lt"/>
-                        </a:rPr>
-                        <a:t>FAR</a:t>
-                      </a:r>
-                      <a:r>
-                        <a:rPr lang="en-US" dirty="0" smtClean="0">
-                          <a:latin typeface="+mn-lt"/>
-                        </a:rPr>
-                        <a:t>: </a:t>
-                      </a:r>
-                      <a:r>
-                        <a:rPr lang="en-US" dirty="0" smtClean="0">
-                          <a:latin typeface="+mn-lt"/>
-                        </a:rPr>
-                        <a:t>0.61659</a:t>
-                      </a:r>
-                      <a:endParaRPr lang="en-US" dirty="0">
-                        <a:latin typeface="+mn-lt"/>
-                      </a:endParaRPr>
-                    </a:p>
-                  </a:txBody>
-                  <a:tcPr/>
-                </a:tc>
-                <a:tc>
-                  <a:txBody>
-                    <a:bodyPr/>
-                    <a:lstStyle/>
-                    <a:p>
-                      <a:r>
-                        <a:rPr lang="en-US" dirty="0" smtClean="0">
-                          <a:latin typeface="+mn-lt"/>
-                        </a:rPr>
-                        <a:t>FRR: </a:t>
-                      </a:r>
-                      <a:r>
-                        <a:rPr lang="en-US" dirty="0" smtClean="0">
-                          <a:latin typeface="+mn-lt"/>
-                        </a:rPr>
-                        <a:t>0.47804</a:t>
-                      </a:r>
-                    </a:p>
-                    <a:p>
-                      <a:r>
-                        <a:rPr lang="en-US" dirty="0" smtClean="0">
-                          <a:latin typeface="+mn-lt"/>
-                        </a:rPr>
-                        <a:t>FAR</a:t>
-                      </a:r>
-                      <a:r>
-                        <a:rPr lang="en-US" dirty="0" smtClean="0">
-                          <a:latin typeface="+mn-lt"/>
-                        </a:rPr>
-                        <a:t>: </a:t>
-                      </a:r>
-                      <a:r>
-                        <a:rPr lang="en-US" dirty="0" smtClean="0">
-                          <a:latin typeface="+mn-lt"/>
-                        </a:rPr>
-                        <a:t>0.41512</a:t>
+                        <a:t>FRR: 0.45454</a:t>
+                      </a:r>
+                    </a:p>
+                    <a:p>
+                      <a:r>
+                        <a:rPr lang="en-US" dirty="0" smtClean="0">
+                          <a:latin typeface="+mn-lt"/>
+                        </a:rPr>
+                        <a:t>FAR: 0.46605 </a:t>
+                      </a:r>
+                    </a:p>
+                  </a:txBody>
+                  <a:tcPr/>
+                </a:tc>
+                <a:tc>
+                  <a:txBody>
+                    <a:bodyPr/>
+                    <a:lstStyle/>
+                    <a:p>
+                      <a:r>
+                        <a:rPr lang="en-US" dirty="0" smtClean="0">
+                          <a:latin typeface="+mn-lt"/>
+                        </a:rPr>
+                        <a:t>FRR: 0.49275</a:t>
+                      </a:r>
+                    </a:p>
+                    <a:p>
+                      <a:r>
+                        <a:rPr lang="en-US" dirty="0" smtClean="0">
+                          <a:latin typeface="+mn-lt"/>
+                        </a:rPr>
+                        <a:t>FAR: 0.41251</a:t>
+                      </a:r>
+                      <a:endParaRPr lang="en-US" dirty="0">
+                        <a:latin typeface="+mn-lt"/>
+                      </a:endParaRPr>
+                    </a:p>
+                  </a:txBody>
+                  <a:tcPr/>
+                </a:tc>
+                <a:tc>
+                  <a:txBody>
+                    <a:bodyPr/>
+                    <a:lstStyle/>
+                    <a:p>
+                      <a:r>
+                        <a:rPr lang="en-US" dirty="0" smtClean="0">
+                          <a:latin typeface="+mn-lt"/>
+                        </a:rPr>
+                        <a:t>FRR: 0.42352</a:t>
+                      </a:r>
+                    </a:p>
+                    <a:p>
+                      <a:r>
+                        <a:rPr lang="en-US" dirty="0" smtClean="0">
+                          <a:latin typeface="+mn-lt"/>
+                        </a:rPr>
+                        <a:t>FAR: 0.40416</a:t>
+                      </a:r>
+                      <a:endParaRPr lang="en-US" dirty="0">
+                        <a:latin typeface="+mn-lt"/>
+                      </a:endParaRPr>
+                    </a:p>
+                  </a:txBody>
+                  <a:tcPr/>
+                </a:tc>
+                <a:tc>
+                  <a:txBody>
+                    <a:bodyPr/>
+                    <a:lstStyle/>
+                    <a:p>
+                      <a:r>
+                        <a:rPr lang="en-US" dirty="0" smtClean="0">
+                          <a:latin typeface="+mn-lt"/>
+                        </a:rPr>
+                        <a:t>FRR: 0.43820</a:t>
+                      </a:r>
+                    </a:p>
+                    <a:p>
+                      <a:r>
+                        <a:rPr lang="en-US" dirty="0" smtClean="0">
+                          <a:latin typeface="+mn-lt"/>
+                        </a:rPr>
+                        <a:t>FAR: 0.61659</a:t>
+                      </a:r>
+                      <a:endParaRPr lang="en-US" dirty="0">
+                        <a:latin typeface="+mn-lt"/>
+                      </a:endParaRPr>
+                    </a:p>
+                  </a:txBody>
+                  <a:tcPr/>
+                </a:tc>
+                <a:tc>
+                  <a:txBody>
+                    <a:bodyPr/>
+                    <a:lstStyle/>
+                    <a:p>
+                      <a:r>
+                        <a:rPr lang="en-US" dirty="0" smtClean="0">
+                          <a:latin typeface="+mn-lt"/>
+                        </a:rPr>
+                        <a:t>FRR: 0.47804</a:t>
+                      </a:r>
+                    </a:p>
+                    <a:p>
+                      <a:r>
+                        <a:rPr lang="en-US" dirty="0" smtClean="0">
+                          <a:latin typeface="+mn-lt"/>
+                        </a:rPr>
+                        <a:t>FAR: 0.41512</a:t>
                       </a:r>
                       <a:endParaRPr lang="en-US" dirty="0">
                         <a:latin typeface="+mn-lt"/>
@@ -5617,197 +5301,119 @@
                         <a:rPr lang="en-US" dirty="0" smtClean="0">
                           <a:latin typeface="+mn-lt"/>
                         </a:rPr>
-                        <a:t>FRR: </a:t>
-                      </a:r>
-                      <a:r>
-                        <a:rPr lang="en-US" dirty="0" smtClean="0">
-                          <a:latin typeface="+mn-lt"/>
-                        </a:rPr>
-                        <a:t>0.41628</a:t>
-                      </a:r>
-                      <a:endParaRPr lang="en-US" dirty="0" smtClean="0">
-                        <a:latin typeface="+mn-lt"/>
-                      </a:endParaRPr>
-                    </a:p>
-                    <a:p>
-                      <a:r>
-                        <a:rPr lang="en-US" dirty="0" smtClean="0">
-                          <a:latin typeface="+mn-lt"/>
-                        </a:rPr>
-                        <a:t>FAR: </a:t>
-                      </a:r>
-                      <a:r>
-                        <a:rPr lang="en-US" dirty="0" smtClean="0">
-                          <a:latin typeface="+mn-lt"/>
-                        </a:rPr>
-                        <a:t>0.61578</a:t>
-                      </a:r>
-                      <a:endParaRPr lang="en-US" dirty="0">
-                        <a:latin typeface="+mn-lt"/>
-                      </a:endParaRPr>
-                    </a:p>
-                  </a:txBody>
-                  <a:tcPr/>
-                </a:tc>
-                <a:tc>
-                  <a:txBody>
-                    <a:bodyPr/>
-                    <a:lstStyle/>
-                    <a:p>
-                      <a:r>
-                        <a:rPr lang="en-US" dirty="0" smtClean="0">
-                          <a:latin typeface="+mn-lt"/>
-                        </a:rPr>
-                        <a:t>FRR: </a:t>
-                      </a:r>
-                      <a:r>
-                        <a:rPr lang="en-US" dirty="0" smtClean="0">
-                          <a:latin typeface="+mn-lt"/>
-                        </a:rPr>
-                        <a:t>0.41791</a:t>
-                      </a:r>
-                      <a:endParaRPr lang="en-US" dirty="0" smtClean="0">
-                        <a:latin typeface="+mn-lt"/>
-                      </a:endParaRPr>
-                    </a:p>
-                    <a:p>
-                      <a:r>
-                        <a:rPr lang="en-US" dirty="0" smtClean="0">
-                          <a:latin typeface="+mn-lt"/>
-                        </a:rPr>
-                        <a:t>FAR: </a:t>
-                      </a:r>
-                      <a:r>
-                        <a:rPr lang="en-US" dirty="0" smtClean="0">
-                          <a:latin typeface="+mn-lt"/>
-                        </a:rPr>
-                        <a:t>0.56449</a:t>
-                      </a:r>
-                      <a:endParaRPr lang="en-US" dirty="0">
-                        <a:latin typeface="+mn-lt"/>
-                      </a:endParaRPr>
-                    </a:p>
-                  </a:txBody>
-                  <a:tcPr/>
-                </a:tc>
-                <a:tc>
-                  <a:txBody>
-                    <a:bodyPr/>
-                    <a:lstStyle/>
-                    <a:p>
-                      <a:r>
-                        <a:rPr lang="en-US" dirty="0" smtClean="0">
-                          <a:latin typeface="+mn-lt"/>
-                        </a:rPr>
-                        <a:t>FRR: </a:t>
-                      </a:r>
-                      <a:r>
-                        <a:rPr lang="en-US" dirty="0" smtClean="0">
-                          <a:latin typeface="+mn-lt"/>
-                        </a:rPr>
-                        <a:t>0.42424</a:t>
-                      </a:r>
-                    </a:p>
-                    <a:p>
-                      <a:r>
-                        <a:rPr lang="en-US" dirty="0" smtClean="0">
-                          <a:latin typeface="+mn-lt"/>
-                        </a:rPr>
-                        <a:t>FAR</a:t>
-                      </a:r>
-                      <a:r>
-                        <a:rPr lang="en-US" dirty="0" smtClean="0">
-                          <a:latin typeface="+mn-lt"/>
-                        </a:rPr>
-                        <a:t>: </a:t>
-                      </a:r>
-                      <a:r>
-                        <a:rPr lang="en-US" dirty="0" smtClean="0">
-                          <a:latin typeface="+mn-lt"/>
-                        </a:rPr>
-                        <a:t>0.47704</a:t>
-                      </a:r>
-                      <a:endParaRPr lang="en-US" dirty="0">
-                        <a:latin typeface="+mn-lt"/>
-                      </a:endParaRPr>
-                    </a:p>
-                  </a:txBody>
-                  <a:tcPr/>
-                </a:tc>
-                <a:tc>
-                  <a:txBody>
-                    <a:bodyPr/>
-                    <a:lstStyle/>
-                    <a:p>
-                      <a:r>
-                        <a:rPr lang="en-US" dirty="0" smtClean="0">
-                          <a:latin typeface="+mn-lt"/>
-                        </a:rPr>
-                        <a:t>FRR: </a:t>
-                      </a:r>
-                      <a:r>
-                        <a:rPr lang="en-US" dirty="0" smtClean="0">
-                          <a:latin typeface="+mn-lt"/>
-                        </a:rPr>
-                        <a:t>0.5</a:t>
-                      </a:r>
-                      <a:endParaRPr lang="en-US" dirty="0" smtClean="0">
-                        <a:latin typeface="+mn-lt"/>
-                      </a:endParaRPr>
-                    </a:p>
-                    <a:p>
-                      <a:r>
-                        <a:rPr lang="en-US" dirty="0" smtClean="0">
-                          <a:latin typeface="+mn-lt"/>
-                        </a:rPr>
-                        <a:t>FAR: </a:t>
-                      </a:r>
-                      <a:r>
-                        <a:rPr lang="en-US" dirty="0" smtClean="0">
-                          <a:latin typeface="+mn-lt"/>
-                        </a:rPr>
-                        <a:t>0.51381</a:t>
-                      </a:r>
-                      <a:endParaRPr lang="en-US" dirty="0">
-                        <a:latin typeface="+mn-lt"/>
-                      </a:endParaRPr>
-                    </a:p>
-                  </a:txBody>
-                  <a:tcPr/>
-                </a:tc>
-                <a:tc>
-                  <a:txBody>
-                    <a:bodyPr/>
-                    <a:lstStyle/>
-                    <a:p>
-                      <a:r>
-                        <a:rPr lang="en-US" dirty="0" smtClean="0">
-                          <a:latin typeface="+mn-lt"/>
-                        </a:rPr>
-                        <a:t>FRR: </a:t>
-                      </a:r>
-                      <a:r>
-                        <a:rPr lang="en-US" dirty="0" smtClean="0">
-                          <a:latin typeface="+mn-lt"/>
-                        </a:rPr>
-                        <a:t>0.51523</a:t>
-                      </a:r>
-                      <a:endParaRPr lang="en-US" dirty="0" smtClean="0">
-                        <a:latin typeface="+mn-lt"/>
-                      </a:endParaRPr>
-                    </a:p>
-                    <a:p>
-                      <a:r>
-                        <a:rPr lang="en-US" dirty="0" smtClean="0">
-                          <a:latin typeface="+mn-lt"/>
-                        </a:rPr>
-                        <a:t>FAR: </a:t>
-                      </a:r>
-                      <a:r>
-                        <a:rPr lang="en-US" dirty="0" smtClean="0">
-                          <a:latin typeface="+mn-lt"/>
-                        </a:rPr>
-                        <a:t>0.50489</a:t>
+                        <a:t>FRR: 0.41628</a:t>
+                      </a:r>
+                    </a:p>
+                    <a:p>
+                      <a:r>
+                        <a:rPr lang="en-US" dirty="0" smtClean="0">
+                          <a:latin typeface="+mn-lt"/>
+                        </a:rPr>
+                        <a:t>FAR: 0.61578</a:t>
+                      </a:r>
+                      <a:endParaRPr lang="en-US" dirty="0">
+                        <a:latin typeface="+mn-lt"/>
+                      </a:endParaRPr>
+                    </a:p>
+                  </a:txBody>
+                  <a:tcPr/>
+                </a:tc>
+                <a:tc>
+                  <a:txBody>
+                    <a:bodyPr/>
+                    <a:lstStyle/>
+                    <a:p>
+                      <a:r>
+                        <a:rPr lang="en-US" dirty="0" smtClean="0">
+                          <a:latin typeface="+mn-lt"/>
+                        </a:rPr>
+                        <a:t>FRR: 0.41791</a:t>
+                      </a:r>
+                    </a:p>
+                    <a:p>
+                      <a:r>
+                        <a:rPr lang="en-US" dirty="0" smtClean="0">
+                          <a:latin typeface="+mn-lt"/>
+                        </a:rPr>
+                        <a:t>FAR: 0.56449</a:t>
+                      </a:r>
+                      <a:endParaRPr lang="en-US" dirty="0">
+                        <a:latin typeface="+mn-lt"/>
+                      </a:endParaRPr>
+                    </a:p>
+                  </a:txBody>
+                  <a:tcPr/>
+                </a:tc>
+                <a:tc>
+                  <a:txBody>
+                    <a:bodyPr/>
+                    <a:lstStyle/>
+                    <a:p>
+                      <a:r>
+                        <a:rPr lang="en-US" dirty="0" smtClean="0">
+                          <a:latin typeface="+mn-lt"/>
+                        </a:rPr>
+                        <a:t>FRR: 0.42424</a:t>
+                      </a:r>
+                    </a:p>
+                    <a:p>
+                      <a:r>
+                        <a:rPr lang="en-US" dirty="0" smtClean="0">
+                          <a:latin typeface="+mn-lt"/>
+                        </a:rPr>
+                        <a:t>FAR: 0.47704</a:t>
+                      </a:r>
+                      <a:endParaRPr lang="en-US" dirty="0">
+                        <a:latin typeface="+mn-lt"/>
+                      </a:endParaRPr>
+                    </a:p>
+                  </a:txBody>
+                  <a:tcPr/>
+                </a:tc>
+                <a:tc>
+                  <a:txBody>
+                    <a:bodyPr/>
+                    <a:lstStyle/>
+                    <a:p>
+                      <a:r>
+                        <a:rPr lang="en-US" dirty="0" smtClean="0">
+                          <a:latin typeface="+mn-lt"/>
+                        </a:rPr>
+                        <a:t>FRR: 0.5</a:t>
+                      </a:r>
+                    </a:p>
+                    <a:p>
+                      <a:r>
+                        <a:rPr lang="en-US" dirty="0" smtClean="0">
+                          <a:latin typeface="+mn-lt"/>
+                        </a:rPr>
+                        <a:t>FAR: 0.51381</a:t>
+                      </a:r>
+                      <a:endParaRPr lang="en-US" dirty="0">
+                        <a:latin typeface="+mn-lt"/>
+                      </a:endParaRPr>
+                    </a:p>
+                  </a:txBody>
+                  <a:tcPr/>
+                </a:tc>
+                <a:tc>
+                  <a:txBody>
+                    <a:bodyPr/>
+                    <a:lstStyle/>
+                    <a:p>
+                      <a:r>
+                        <a:rPr lang="en-US" dirty="0" smtClean="0">
+                          <a:latin typeface="+mn-lt"/>
+                        </a:rPr>
+                        <a:t>FRR: 0.51523</a:t>
+                      </a:r>
+                    </a:p>
+                    <a:p>
+                      <a:r>
+                        <a:rPr lang="en-US" dirty="0" smtClean="0">
+                          <a:latin typeface="+mn-lt"/>
+                        </a:rPr>
+                        <a:t>FAR: 0.50489</a:t>
                       </a:r>
                       <a:endParaRPr lang="en-US" dirty="0">
                         <a:latin typeface="+mn-lt"/>
@@ -5859,200 +5465,119 @@
                         <a:rPr lang="en-US" dirty="0" smtClean="0">
                           <a:latin typeface="+mn-lt"/>
                         </a:rPr>
-                        <a:t>FRR: </a:t>
-                      </a:r>
-                      <a:r>
-                        <a:rPr lang="en-US" dirty="0" smtClean="0">
-                          <a:latin typeface="+mn-lt"/>
-                        </a:rPr>
-                        <a:t>0.3935</a:t>
-                      </a:r>
-                    </a:p>
-                    <a:p>
-                      <a:r>
-                        <a:rPr lang="en-US" dirty="0" smtClean="0">
-                          <a:latin typeface="+mn-lt"/>
-                        </a:rPr>
-                        <a:t>FAR</a:t>
-                      </a:r>
-                      <a:r>
-                        <a:rPr lang="en-US" dirty="0" smtClean="0">
-                          <a:latin typeface="+mn-lt"/>
-                        </a:rPr>
-                        <a:t>: </a:t>
-                      </a:r>
-                      <a:r>
-                        <a:rPr lang="en-US" dirty="0" smtClean="0">
-                          <a:latin typeface="+mn-lt"/>
-                        </a:rPr>
-                        <a:t>0.48854</a:t>
-                      </a:r>
-                      <a:endParaRPr lang="en-US" dirty="0">
-                        <a:latin typeface="+mn-lt"/>
-                      </a:endParaRPr>
-                    </a:p>
-                  </a:txBody>
-                  <a:tcPr/>
-                </a:tc>
-                <a:tc>
-                  <a:txBody>
-                    <a:bodyPr/>
-                    <a:lstStyle/>
-                    <a:p>
-                      <a:r>
-                        <a:rPr lang="en-US" dirty="0" smtClean="0">
-                          <a:latin typeface="+mn-lt"/>
-                        </a:rPr>
-                        <a:t>FRR: </a:t>
-                      </a:r>
-                      <a:r>
-                        <a:rPr lang="en-US" dirty="0" smtClean="0">
-                          <a:latin typeface="+mn-lt"/>
-                        </a:rPr>
-                        <a:t>0.44680</a:t>
-                      </a:r>
-                    </a:p>
-                    <a:p>
-                      <a:r>
-                        <a:rPr lang="en-US" dirty="0" smtClean="0">
-                          <a:latin typeface="+mn-lt"/>
-                        </a:rPr>
-                        <a:t>FAR</a:t>
-                      </a:r>
-                      <a:r>
-                        <a:rPr lang="en-US" dirty="0" smtClean="0">
-                          <a:latin typeface="+mn-lt"/>
-                        </a:rPr>
-                        <a:t>: </a:t>
-                      </a:r>
-                      <a:r>
-                        <a:rPr lang="en-US" dirty="0" smtClean="0">
-                          <a:latin typeface="+mn-lt"/>
-                        </a:rPr>
-                        <a:t>0.53206</a:t>
-                      </a:r>
-                      <a:endParaRPr lang="en-US" dirty="0">
-                        <a:latin typeface="+mn-lt"/>
-                      </a:endParaRPr>
-                    </a:p>
-                  </a:txBody>
-                  <a:tcPr/>
-                </a:tc>
-                <a:tc>
-                  <a:txBody>
-                    <a:bodyPr/>
-                    <a:lstStyle/>
-                    <a:p>
-                      <a:r>
-                        <a:rPr lang="en-US" dirty="0" smtClean="0">
-                          <a:latin typeface="+mn-lt"/>
-                        </a:rPr>
-                        <a:t>FRR: </a:t>
-                      </a:r>
-                      <a:r>
-                        <a:rPr lang="en-US" dirty="0" smtClean="0">
-                          <a:latin typeface="+mn-lt"/>
-                        </a:rPr>
-                        <a:t>0.36633</a:t>
-                      </a:r>
-                      <a:endParaRPr lang="en-US" dirty="0" smtClean="0">
-                        <a:latin typeface="+mn-lt"/>
-                      </a:endParaRPr>
-                    </a:p>
-                    <a:p>
-                      <a:r>
-                        <a:rPr lang="en-US" dirty="0" smtClean="0">
-                          <a:latin typeface="+mn-lt"/>
-                        </a:rPr>
-                        <a:t>FAR: </a:t>
-                      </a:r>
-                      <a:r>
-                        <a:rPr lang="en-US" dirty="0" smtClean="0">
-                          <a:latin typeface="+mn-lt"/>
-                        </a:rPr>
-                        <a:t>0.54357</a:t>
-                      </a:r>
-                      <a:endParaRPr lang="en-US" dirty="0">
-                        <a:latin typeface="+mn-lt"/>
-                      </a:endParaRPr>
-                    </a:p>
-                  </a:txBody>
-                  <a:tcPr/>
-                </a:tc>
-                <a:tc>
-                  <a:txBody>
-                    <a:bodyPr/>
-                    <a:lstStyle/>
-                    <a:p>
-                      <a:r>
-                        <a:rPr lang="en-US" dirty="0" smtClean="0">
-                          <a:latin typeface="+mn-lt"/>
-                        </a:rPr>
-                        <a:t>FRR: </a:t>
-                      </a:r>
-                      <a:r>
-                        <a:rPr lang="en-US" dirty="0" smtClean="0">
-                          <a:latin typeface="+mn-lt"/>
-                        </a:rPr>
-                        <a:t>0.44761</a:t>
-                      </a:r>
-                      <a:endParaRPr lang="en-US" dirty="0" smtClean="0">
-                        <a:latin typeface="+mn-lt"/>
-                      </a:endParaRPr>
-                    </a:p>
-                    <a:p>
-                      <a:r>
-                        <a:rPr lang="en-US" dirty="0" smtClean="0">
-                          <a:latin typeface="+mn-lt"/>
-                        </a:rPr>
-                        <a:t>FAR: </a:t>
-                      </a:r>
-                      <a:r>
-                        <a:rPr lang="en-US" dirty="0" smtClean="0">
-                          <a:latin typeface="+mn-lt"/>
-                        </a:rPr>
-                        <a:t>0.55225</a:t>
-                      </a:r>
-                      <a:endParaRPr lang="en-US" dirty="0">
-                        <a:latin typeface="+mn-lt"/>
-                      </a:endParaRPr>
-                    </a:p>
-                  </a:txBody>
-                  <a:tcPr/>
-                </a:tc>
-                <a:tc>
-                  <a:txBody>
-                    <a:bodyPr/>
-                    <a:lstStyle/>
-                    <a:p>
-                      <a:r>
-                        <a:rPr lang="en-US" dirty="0" smtClean="0">
-                          <a:latin typeface="+mn-lt"/>
-                        </a:rPr>
-                        <a:t>FRR: </a:t>
-                      </a:r>
-                      <a:r>
-                        <a:rPr lang="en-US" dirty="0" smtClean="0">
-                          <a:latin typeface="+mn-lt"/>
-                        </a:rPr>
-                        <a:t>0.44911</a:t>
-                      </a:r>
-                      <a:endParaRPr lang="en-US" dirty="0" smtClean="0">
-                        <a:latin typeface="+mn-lt"/>
-                      </a:endParaRPr>
-                    </a:p>
-                    <a:p>
-                      <a:r>
-                        <a:rPr lang="en-US" dirty="0" smtClean="0">
-                          <a:latin typeface="+mn-lt"/>
-                        </a:rPr>
-                        <a:t>FAR: </a:t>
-                      </a:r>
-                      <a:r>
-                        <a:rPr lang="en-US" dirty="0" smtClean="0">
-                          <a:latin typeface="+mn-lt"/>
-                        </a:rPr>
-                        <a:t>0.53876</a:t>
+                        <a:t>FRR: 0.3935</a:t>
+                      </a:r>
+                    </a:p>
+                    <a:p>
+                      <a:r>
+                        <a:rPr lang="en-US" dirty="0" smtClean="0">
+                          <a:latin typeface="+mn-lt"/>
+                        </a:rPr>
+                        <a:t>FAR: 0.48854</a:t>
+                      </a:r>
+                      <a:endParaRPr lang="en-US" dirty="0">
+                        <a:latin typeface="+mn-lt"/>
+                      </a:endParaRPr>
+                    </a:p>
+                  </a:txBody>
+                  <a:tcPr/>
+                </a:tc>
+                <a:tc>
+                  <a:txBody>
+                    <a:bodyPr/>
+                    <a:lstStyle/>
+                    <a:p>
+                      <a:r>
+                        <a:rPr lang="en-US" dirty="0" smtClean="0">
+                          <a:latin typeface="+mn-lt"/>
+                        </a:rPr>
+                        <a:t>FRR: 0.44680</a:t>
+                      </a:r>
+                    </a:p>
+                    <a:p>
+                      <a:r>
+                        <a:rPr lang="en-US" dirty="0" smtClean="0">
+                          <a:latin typeface="+mn-lt"/>
+                        </a:rPr>
+                        <a:t>FAR: 0.53206</a:t>
+                      </a:r>
+                      <a:endParaRPr lang="en-US" dirty="0">
+                        <a:latin typeface="+mn-lt"/>
+                      </a:endParaRPr>
+                    </a:p>
+                  </a:txBody>
+                  <a:tcPr/>
+                </a:tc>
+                <a:tc>
+                  <a:txBody>
+                    <a:bodyPr/>
+                    <a:lstStyle/>
+                    <a:p>
+                      <a:r>
+                        <a:rPr lang="en-US" dirty="0" smtClean="0">
+                          <a:latin typeface="+mn-lt"/>
+                        </a:rPr>
+                        <a:t>FRR: 0.36633</a:t>
+                      </a:r>
+                    </a:p>
+                    <a:p>
+                      <a:r>
+                        <a:rPr lang="en-US" dirty="0" smtClean="0">
+                          <a:latin typeface="+mn-lt"/>
+                        </a:rPr>
+                        <a:t>FAR: 0.54357</a:t>
+                      </a:r>
+                      <a:endParaRPr lang="en-US" dirty="0">
+                        <a:latin typeface="+mn-lt"/>
+                      </a:endParaRPr>
+                    </a:p>
+                  </a:txBody>
+                  <a:tcPr/>
+                </a:tc>
+                <a:tc>
+                  <a:txBody>
+                    <a:bodyPr/>
+                    <a:lstStyle/>
+                    <a:p>
+                      <a:r>
+                        <a:rPr lang="en-US" dirty="0" smtClean="0">
+                          <a:latin typeface="+mn-lt"/>
+                        </a:rPr>
+                        <a:t>FRR: 0.44761</a:t>
+                      </a:r>
+                    </a:p>
+                    <a:p>
+                      <a:r>
+                        <a:rPr lang="en-US" dirty="0" smtClean="0">
+                          <a:latin typeface="+mn-lt"/>
+                        </a:rPr>
+                        <a:t>FAR: 0.55225</a:t>
+                      </a:r>
+                      <a:endParaRPr lang="en-US" dirty="0">
+                        <a:latin typeface="+mn-lt"/>
+                      </a:endParaRPr>
+                    </a:p>
+                  </a:txBody>
+                  <a:tcPr/>
+                </a:tc>
+                <a:tc>
+                  <a:txBody>
+                    <a:bodyPr/>
+                    <a:lstStyle/>
+                    <a:p>
+                      <a:r>
+                        <a:rPr lang="en-US" dirty="0" smtClean="0">
+                          <a:latin typeface="+mn-lt"/>
+                        </a:rPr>
+                        <a:t>FRR: 0.44911</a:t>
+                      </a:r>
+                    </a:p>
+                    <a:p>
+                      <a:r>
+                        <a:rPr lang="en-US" dirty="0" smtClean="0">
+                          <a:latin typeface="+mn-lt"/>
+                        </a:rPr>
+                        <a:t>FAR: 0.53876</a:t>
                       </a:r>
                       <a:endParaRPr lang="en-US" dirty="0">
                         <a:latin typeface="+mn-lt"/>
@@ -6096,30 +5621,15 @@
                         <a:rPr lang="en-US" dirty="0" smtClean="0">
                           <a:latin typeface="+mn-lt"/>
                         </a:rPr>
-                        <a:t>FRR: </a:t>
-                      </a:r>
-                      <a:r>
-                        <a:rPr lang="en-US" dirty="0" smtClean="0">
-                          <a:latin typeface="+mn-lt"/>
-                        </a:rPr>
-                        <a:t>0.44713</a:t>
-                      </a:r>
-                      <a:endParaRPr lang="en-US" dirty="0" smtClean="0">
-                        <a:latin typeface="+mn-lt"/>
-                      </a:endParaRPr>
-                    </a:p>
-                    <a:p>
-                      <a:r>
-                        <a:rPr lang="en-US" dirty="0" smtClean="0">
-                          <a:latin typeface="+mn-lt"/>
-                        </a:rPr>
-                        <a:t>FAR: </a:t>
-                      </a:r>
-                      <a:r>
-                        <a:rPr lang="en-US" dirty="0" smtClean="0">
-                          <a:latin typeface="+mn-lt"/>
-                        </a:rPr>
-                        <a:t>0.52240</a:t>
+                        <a:t>FRR: 0.44713</a:t>
+                      </a:r>
+                    </a:p>
+                    <a:p>
+                      <a:r>
+                        <a:rPr lang="en-US" dirty="0" smtClean="0">
+                          <a:latin typeface="+mn-lt"/>
+                        </a:rPr>
+                        <a:t>FAR: 0.52240</a:t>
                       </a:r>
                       <a:endParaRPr lang="en-US" dirty="0">
                         <a:solidFill>
@@ -6140,30 +5650,15 @@
                         <a:rPr lang="en-US" dirty="0" smtClean="0">
                           <a:latin typeface="+mn-lt"/>
                         </a:rPr>
-                        <a:t>FRR: </a:t>
-                      </a:r>
-                      <a:r>
-                        <a:rPr lang="en-US" dirty="0" smtClean="0">
-                          <a:latin typeface="+mn-lt"/>
-                        </a:rPr>
-                        <a:t>0.47221</a:t>
-                      </a:r>
-                      <a:endParaRPr lang="en-US" dirty="0" smtClean="0">
-                        <a:latin typeface="+mn-lt"/>
-                      </a:endParaRPr>
-                    </a:p>
-                    <a:p>
-                      <a:r>
-                        <a:rPr lang="en-US" dirty="0" smtClean="0">
-                          <a:latin typeface="+mn-lt"/>
-                        </a:rPr>
-                        <a:t>FAR: </a:t>
-                      </a:r>
-                      <a:r>
-                        <a:rPr lang="en-US" dirty="0" smtClean="0">
-                          <a:latin typeface="+mn-lt"/>
-                        </a:rPr>
-                        <a:t>0.51011</a:t>
+                        <a:t>FRR: 0.47221</a:t>
+                      </a:r>
+                    </a:p>
+                    <a:p>
+                      <a:r>
+                        <a:rPr lang="en-US" dirty="0" smtClean="0">
+                          <a:latin typeface="+mn-lt"/>
+                        </a:rPr>
+                        <a:t>FAR: 0.51011</a:t>
                       </a:r>
                       <a:endParaRPr lang="en-US" dirty="0">
                         <a:solidFill>
@@ -6184,30 +5679,15 @@
                         <a:rPr lang="en-US" dirty="0" smtClean="0">
                           <a:latin typeface="+mn-lt"/>
                         </a:rPr>
-                        <a:t>FRR: </a:t>
-                      </a:r>
-                      <a:r>
-                        <a:rPr lang="en-US" dirty="0" smtClean="0">
-                          <a:latin typeface="+mn-lt"/>
-                        </a:rPr>
-                        <a:t>0.45355</a:t>
-                      </a:r>
-                      <a:endParaRPr lang="en-US" dirty="0" smtClean="0">
-                        <a:latin typeface="+mn-lt"/>
-                      </a:endParaRPr>
-                    </a:p>
-                    <a:p>
-                      <a:r>
-                        <a:rPr lang="en-US" dirty="0" smtClean="0">
-                          <a:latin typeface="+mn-lt"/>
-                        </a:rPr>
-                        <a:t>FAR: </a:t>
-                      </a:r>
-                      <a:r>
-                        <a:rPr lang="en-US" dirty="0" smtClean="0">
-                          <a:latin typeface="+mn-lt"/>
-                        </a:rPr>
-                        <a:t>0.51923</a:t>
+                        <a:t>FRR: 0.45355</a:t>
+                      </a:r>
+                    </a:p>
+                    <a:p>
+                      <a:r>
+                        <a:rPr lang="en-US" dirty="0" smtClean="0">
+                          <a:latin typeface="+mn-lt"/>
+                        </a:rPr>
+                        <a:t>FAR: 0.51923</a:t>
                       </a:r>
                       <a:endParaRPr lang="en-US" dirty="0">
                         <a:solidFill>
@@ -6257,30 +5737,15 @@
                         <a:rPr lang="en-US" dirty="0" smtClean="0">
                           <a:latin typeface="+mn-lt"/>
                         </a:rPr>
-                        <a:t>FRR: </a:t>
-                      </a:r>
-                      <a:r>
-                        <a:rPr lang="en-US" dirty="0" smtClean="0">
-                          <a:latin typeface="+mn-lt"/>
-                        </a:rPr>
-                        <a:t>0.47808</a:t>
-                      </a:r>
-                      <a:endParaRPr lang="en-US" dirty="0" smtClean="0">
-                        <a:latin typeface="+mn-lt"/>
-                      </a:endParaRPr>
-                    </a:p>
-                    <a:p>
-                      <a:r>
-                        <a:rPr lang="en-US" dirty="0" smtClean="0">
-                          <a:latin typeface="+mn-lt"/>
-                        </a:rPr>
-                        <a:t>FAR: </a:t>
-                      </a:r>
-                      <a:r>
-                        <a:rPr lang="en-US" dirty="0" smtClean="0">
-                          <a:latin typeface="+mn-lt"/>
-                        </a:rPr>
-                        <a:t>0.48861</a:t>
+                        <a:t>FRR: 0.47808</a:t>
+                      </a:r>
+                    </a:p>
+                    <a:p>
+                      <a:r>
+                        <a:rPr lang="en-US" dirty="0" smtClean="0">
+                          <a:latin typeface="+mn-lt"/>
+                        </a:rPr>
+                        <a:t>FAR: 0.48861</a:t>
                       </a:r>
                       <a:endParaRPr lang="en-US" dirty="0">
                         <a:solidFill>

</xml_diff>